<commit_message>
Added stuff for week3
</commit_message>
<xml_diff>
--- a/slides/week3_tues.pptx
+++ b/slides/week3_tues.pptx
@@ -206,7 +206,7 @@
             <a:fld id="{43DBBD18-6C88-F045-A73C-EAB7098132B3}" type="datetime1">
               <a:rPr lang="en-US" smtClean="0"/>
               <a:pPr/>
-              <a:t>10/12/10</a:t>
+              <a:t>10/13/10</a:t>
             </a:fld>
             <a:endParaRPr lang="en-US"/>
           </a:p>
@@ -369,7 +369,7 @@
             <a:fld id="{EAEF232E-3F8A-2D4B-A08F-882F821D32B7}" type="datetime1">
               <a:rPr lang="en-US" smtClean="0"/>
               <a:pPr/>
-              <a:t>10/12/10</a:t>
+              <a:t>10/13/10</a:t>
             </a:fld>
             <a:endParaRPr lang="en-US"/>
           </a:p>
@@ -3872,33 +3872,16 @@
           <a:p>
             <a:r>
               <a:rPr lang="en-US" dirty="0" smtClean="0"/>
-              <a:t>&gt; To</a:t>
-            </a:r>
-            <a:r>
-              <a:rPr lang="en-US" dirty="0" smtClean="0"/>
-              <a:t> give a practical </a:t>
-            </a:r>
-            <a:r>
-              <a:rPr lang="en-US" dirty="0" smtClean="0"/>
-              <a:t>introduction to data structures</a:t>
-            </a:r>
-            <a:endParaRPr lang="en-US" dirty="0" smtClean="0"/>
-          </a:p>
-          <a:p>
-            <a:endParaRPr lang="en-US" dirty="0" smtClean="0"/>
-          </a:p>
-          <a:p>
-            <a:r>
-              <a:rPr lang="en-US" dirty="0" smtClean="0"/>
-              <a:t>&gt; To</a:t>
-            </a:r>
-            <a:r>
-              <a:rPr lang="en-US" dirty="0" smtClean="0"/>
-              <a:t> </a:t>
-            </a:r>
-            <a:r>
-              <a:rPr lang="en-US" dirty="0" smtClean="0"/>
-              <a:t>look specifically at Lists, Sets, and Maps</a:t>
+              <a:t>&gt; To give a practical introduction to data structures</a:t>
+            </a:r>
+          </a:p>
+          <a:p>
+            <a:endParaRPr lang="en-US" dirty="0" smtClean="0"/>
+          </a:p>
+          <a:p>
+            <a:r>
+              <a:rPr lang="en-US" dirty="0" smtClean="0"/>
+              <a:t>&gt; To look specifically at Lists, Sets, and Maps</a:t>
             </a:r>
           </a:p>
           <a:p>
@@ -3909,23 +3892,14 @@
               <a:rPr lang="en-US" dirty="0" smtClean="0"/>
               <a:t>&gt; To talk briefly about Generics in Java</a:t>
             </a:r>
-            <a:endParaRPr lang="en-US" dirty="0" smtClean="0"/>
-          </a:p>
-          <a:p>
-            <a:endParaRPr lang="en-US" dirty="0" smtClean="0"/>
-          </a:p>
-          <a:p>
-            <a:r>
-              <a:rPr lang="en-US" dirty="0" smtClean="0"/>
-              <a:t>&gt; To</a:t>
-            </a:r>
-            <a:r>
-              <a:rPr lang="en-US" dirty="0" smtClean="0"/>
-              <a:t> </a:t>
-            </a:r>
-            <a:r>
-              <a:rPr lang="en-US" dirty="0" smtClean="0"/>
-              <a:t>talk about interfaces in Java</a:t>
+          </a:p>
+          <a:p>
+            <a:endParaRPr lang="en-US" dirty="0" smtClean="0"/>
+          </a:p>
+          <a:p>
+            <a:r>
+              <a:rPr lang="en-US" dirty="0" smtClean="0"/>
+              <a:t>&gt; To talk about interfaces in Java</a:t>
             </a:r>
           </a:p>
           <a:p>
@@ -4063,15 +4037,7 @@
           <a:p>
             <a:r>
               <a:rPr lang="en-US" dirty="0" err="1" smtClean="0"/>
-              <a:t>Collections.sort</a:t>
-            </a:r>
-            <a:r>
-              <a:rPr lang="en-US" dirty="0" err="1" smtClean="0"/>
-              <a:t>(</a:t>
-            </a:r>
-            <a:r>
-              <a:rPr lang="en-US" dirty="0" err="1" smtClean="0"/>
-              <a:t>people</a:t>
+              <a:t>Collections.sort(people</a:t>
             </a:r>
             <a:r>
               <a:rPr lang="en-US" dirty="0" smtClean="0"/>
@@ -4133,11 +4099,7 @@
           <a:p>
             <a:r>
               <a:rPr lang="en-US" dirty="0" smtClean="0"/>
-              <a:t>for (String </a:t>
-            </a:r>
-            <a:r>
-              <a:rPr lang="en-US" dirty="0" smtClean="0"/>
-              <a:t>person : </a:t>
+              <a:t>for (String person : </a:t>
             </a:r>
             <a:r>
               <a:rPr lang="en-US" dirty="0" err="1" smtClean="0"/>
@@ -4155,7 +4117,6 @@
               <a:rPr lang="en-US" dirty="0" smtClean="0"/>
               <a:t>) };</a:t>
             </a:r>
-            <a:endParaRPr lang="en-US" dirty="0" smtClean="0"/>
           </a:p>
           <a:p>
             <a:r>
@@ -4191,6 +4152,13 @@
   <p:clrMapOvr>
     <a:masterClrMapping/>
   </p:clrMapOvr>
+  <p:timing>
+    <p:tnLst>
+      <p:par>
+        <p:cTn id="1" dur="indefinite" restart="never" nodeType="tmRoot"/>
+      </p:par>
+    </p:tnLst>
+  </p:timing>
 </p:sld>
 </file>
 
@@ -4251,11 +4219,19 @@
           <a:p>
             <a:r>
               <a:rPr lang="en-US" dirty="0" smtClean="0"/>
-              <a:t>see </a:t>
-            </a:r>
-            <a:r>
-              <a:rPr lang="en-US" smtClean="0"/>
-              <a:t>code example</a:t>
+              <a:t>see code </a:t>
+            </a:r>
+            <a:r>
+              <a:rPr lang="en-US" dirty="0" smtClean="0"/>
+              <a:t>example (</a:t>
+            </a:r>
+            <a:r>
+              <a:rPr lang="en-US" dirty="0" err="1" smtClean="0"/>
+              <a:t>SetTest.java</a:t>
+            </a:r>
+            <a:r>
+              <a:rPr lang="en-US" smtClean="0"/>
+              <a:t>)</a:t>
             </a:r>
             <a:endParaRPr lang="en-US" dirty="0"/>
           </a:p>
@@ -4266,6 +4242,13 @@
   <p:clrMapOvr>
     <a:masterClrMapping/>
   </p:clrMapOvr>
+  <p:timing>
+    <p:tnLst>
+      <p:par>
+        <p:cTn id="1" dur="indefinite" restart="never" nodeType="tmRoot"/>
+      </p:par>
+    </p:tnLst>
+  </p:timing>
 </p:sld>
 </file>
 
@@ -4303,11 +4286,7 @@
           <a:p>
             <a:r>
               <a:rPr lang="en-US" dirty="0" smtClean="0"/>
-              <a:t>Data </a:t>
-            </a:r>
-            <a:r>
-              <a:rPr lang="en-US" dirty="0" smtClean="0"/>
-              <a:t>Structures</a:t>
+              <a:t>Data Structures</a:t>
             </a:r>
             <a:endParaRPr lang="en-US" dirty="0"/>
           </a:p>
@@ -4333,11 +4312,7 @@
           <a:p>
             <a:r>
               <a:rPr lang="en-US" dirty="0" smtClean="0"/>
-              <a:t>Data structures are objects of data stored in memory in a particular way </a:t>
-            </a:r>
-            <a:r>
-              <a:rPr lang="en-US" dirty="0" smtClean="0"/>
-              <a:t>along with accompanying methods to access them in various ways.</a:t>
+              <a:t>Data structures are objects of data stored in memory in a particular way along with accompanying methods to access them in various ways.</a:t>
             </a:r>
           </a:p>
           <a:p>
@@ -4399,7 +4374,6 @@
               <a:rPr lang="en-US" dirty="0" smtClean="0"/>
               <a:t>How will I most often traverse my data? </a:t>
             </a:r>
-            <a:endParaRPr lang="en-US" dirty="0" smtClean="0"/>
           </a:p>
           <a:p>
             <a:endParaRPr lang="en-US" dirty="0" smtClean="0"/>
@@ -4511,11 +4485,7 @@
             </a:pPr>
             <a:r>
               <a:rPr lang="en-US" dirty="0" smtClean="0"/>
-              <a:t>It provides no actual code, </a:t>
-            </a:r>
-            <a:r>
-              <a:rPr lang="en-US" dirty="0" smtClean="0"/>
-              <a:t>but simply guarantees that the implementing code must include those methods.</a:t>
+              <a:t>It provides no actual code, but simply guarantees that the implementing code must include those methods.</a:t>
             </a:r>
           </a:p>
           <a:p>
@@ -4602,11 +4572,7 @@
             </a:pPr>
             <a:r>
               <a:rPr lang="en-US" dirty="0" smtClean="0"/>
-              <a:t>public interface</a:t>
-            </a:r>
-            <a:r>
-              <a:rPr lang="en-US" dirty="0" smtClean="0"/>
-              <a:t> </a:t>
+              <a:t>public interface </a:t>
             </a:r>
             <a:r>
               <a:rPr lang="en-US" dirty="0" err="1" smtClean="0"/>
@@ -4614,11 +4580,7 @@
             </a:r>
             <a:r>
               <a:rPr lang="en-US" dirty="0" smtClean="0"/>
-              <a:t> </a:t>
-            </a:r>
-            <a:r>
-              <a:rPr lang="en-US" dirty="0" smtClean="0"/>
-              <a:t>{</a:t>
+              <a:t> {</a:t>
             </a:r>
           </a:p>
           <a:p>
@@ -4629,11 +4591,7 @@
             </a:pPr>
             <a:r>
               <a:rPr lang="en-US" dirty="0" smtClean="0"/>
-              <a:t>	public void</a:t>
-            </a:r>
-            <a:r>
-              <a:rPr lang="en-US" dirty="0" smtClean="0"/>
-              <a:t> </a:t>
+              <a:t>	public void </a:t>
             </a:r>
             <a:r>
               <a:rPr lang="en-US" dirty="0" err="1" smtClean="0"/>
@@ -4654,7 +4612,6 @@
               <a:rPr lang="en-US" dirty="0" smtClean="0"/>
               <a:t>}</a:t>
             </a:r>
-            <a:endParaRPr lang="en-US" dirty="0" smtClean="0"/>
           </a:p>
           <a:p>
             <a:pPr marL="0" indent="0">
@@ -4672,7 +4629,7 @@
             </a:pPr>
             <a:r>
               <a:rPr lang="en-US" dirty="0" smtClean="0"/>
-              <a:t>public </a:t>
+              <a:t>public class </a:t>
             </a:r>
             <a:r>
               <a:rPr lang="en-US" dirty="0" err="1" smtClean="0"/>
@@ -4736,7 +4693,6 @@
               <a:rPr lang="en-US" dirty="0" smtClean="0"/>
               <a:t>();</a:t>
             </a:r>
-            <a:endParaRPr lang="en-US" dirty="0" smtClean="0"/>
           </a:p>
           <a:p>
             <a:pPr marL="0" indent="0">
@@ -4748,7 +4704,6 @@
               <a:rPr lang="en-US" dirty="0" smtClean="0"/>
               <a:t>	}</a:t>
             </a:r>
-            <a:endParaRPr lang="en-US" dirty="0" smtClean="0"/>
           </a:p>
           <a:p>
             <a:pPr marL="0" indent="0">
@@ -4850,7 +4805,6 @@
               <a:rPr lang="en-US" dirty="0" smtClean="0"/>
               <a:t>}</a:t>
             </a:r>
-            <a:endParaRPr lang="en-US" dirty="0" smtClean="0"/>
           </a:p>
           <a:p>
             <a:pPr marL="0" indent="0">
@@ -4997,15 +4951,7 @@
             </a:pPr>
             <a:r>
               <a:rPr lang="en-US" dirty="0" smtClean="0"/>
-              <a:t>All Java data structures implement either the "</a:t>
-            </a:r>
-            <a:r>
-              <a:rPr lang="en-US" dirty="0" smtClean="0"/>
-              <a:t>c</a:t>
-            </a:r>
-            <a:r>
-              <a:rPr lang="en-US" dirty="0" smtClean="0"/>
-              <a:t>ollection" interface or the "map" interface.</a:t>
+              <a:t>All Java data structures implement either the "collection" interface or the "map" interface.</a:t>
             </a:r>
           </a:p>
           <a:p>
@@ -5062,11 +5008,7 @@
             </a:pPr>
             <a:r>
               <a:rPr lang="en-US" dirty="0" smtClean="0"/>
-              <a:t>the ability to get the number of elements stored in the data structure</a:t>
-            </a:r>
-            <a:r>
-              <a:rPr lang="en-US" dirty="0" smtClean="0"/>
-              <a:t> </a:t>
+              <a:t>the ability to get the number of elements stored in the data structure </a:t>
             </a:r>
           </a:p>
           <a:p>
@@ -5226,11 +5168,7 @@
           <a:p>
             <a:r>
               <a:rPr lang="en-US" dirty="0" smtClean="0"/>
-              <a:t>A </a:t>
-            </a:r>
-            <a:r>
-              <a:rPr lang="en-US" dirty="0" smtClean="0"/>
-              <a:t>List is a sub-interface of Collection which requires some extra functionality, such as:</a:t>
+              <a:t>A List is a sub-interface of Collection which requires some extra functionality, such as:</a:t>
             </a:r>
           </a:p>
           <a:p>
@@ -5307,7 +5245,20 @@
             </a:r>
             <a:r>
               <a:rPr lang="en-US" dirty="0" smtClean="0"/>
-              <a:t> provides links between each element and its neighbors. It is slower to grab something in the middle of the list (as you have to traverse the List until you find it), but much faster to manipulate. If you add something to it you simply update the links, rather than shifting all of the elements.</a:t>
+              <a:t> provides links between each element and its neighbors. It is slower to grab something in the middle of the list (as you have to traverse the List until you find it), but much faster to manipulate. If you add something to it you simply update the links, rather than shifting all of the elements</a:t>
+            </a:r>
+            <a:r>
+              <a:rPr lang="en-US" dirty="0" smtClean="0"/>
+              <a:t>.</a:t>
+            </a:r>
+          </a:p>
+          <a:p>
+            <a:endParaRPr lang="en-US" dirty="0" smtClean="0"/>
+          </a:p>
+          <a:p>
+            <a:r>
+              <a:rPr lang="en-US" dirty="0" smtClean="0"/>
+              <a:t>(draw on board)</a:t>
             </a:r>
           </a:p>
           <a:p>
@@ -5571,14 +5522,12 @@
               <a:rPr lang="en-US" dirty="0" smtClean="0"/>
               <a:t>}</a:t>
             </a:r>
-            <a:endParaRPr lang="en-US" dirty="0" smtClean="0"/>
           </a:p>
           <a:p>
             <a:r>
               <a:rPr lang="en-US" dirty="0" smtClean="0"/>
               <a:t>	</a:t>
             </a:r>
-            <a:endParaRPr lang="en-US" dirty="0" smtClean="0"/>
           </a:p>
           <a:p>
             <a:endParaRPr lang="en-US" dirty="0" smtClean="0"/>
@@ -5672,11 +5621,7 @@
           <a:p>
             <a:r>
               <a:rPr lang="en-US" dirty="0" smtClean="0"/>
-              <a:t>A Map is a super fast collection which using a hashing function to </a:t>
-            </a:r>
-            <a:r>
-              <a:rPr lang="en-US" dirty="0" smtClean="0"/>
-              <a:t>quickly store and retrieve elements. Also known as a hash table or a dictionary.</a:t>
+              <a:t>A Map is a super fast collection which using a hashing function to quickly store and retrieve elements. Also known as a hash table or a dictionary.</a:t>
             </a:r>
           </a:p>
           <a:p>
@@ -5747,7 +5692,6 @@
               <a:rPr lang="en-US" dirty="0" smtClean="0"/>
               <a:t> </a:t>
             </a:r>
-            <a:endParaRPr lang="en-US" dirty="0" smtClean="0"/>
           </a:p>
           <a:p>
             <a:endParaRPr lang="en-US" dirty="0" smtClean="0"/>
@@ -5780,6 +5724,13 @@
   <p:clrMapOvr>
     <a:masterClrMapping/>
   </p:clrMapOvr>
+  <p:timing>
+    <p:tnLst>
+      <p:par>
+        <p:cTn id="1" dur="indefinite" restart="never" nodeType="tmRoot"/>
+      </p:par>
+    </p:tnLst>
+  </p:timing>
 </p:sld>
 </file>
 
@@ -5903,58 +5854,25 @@
             </a:r>
             <a:r>
               <a:rPr lang="en-US" dirty="0" err="1" smtClean="0"/>
-              <a:t>grades.put</a:t>
+              <a:t>grades.put("Javier</a:t>
+            </a:r>
+            <a:r>
+              <a:rPr lang="en-US" dirty="0" smtClean="0"/>
+              <a:t>", 99);</a:t>
+            </a:r>
+          </a:p>
+          <a:p>
+            <a:r>
+              <a:rPr lang="en-US" dirty="0" smtClean="0"/>
+              <a:t>		</a:t>
             </a:r>
             <a:r>
               <a:rPr lang="en-US" dirty="0" err="1" smtClean="0"/>
-              <a:t>("</a:t>
-            </a:r>
-            <a:r>
-              <a:rPr lang="en-US" dirty="0" err="1" smtClean="0"/>
-              <a:t>Javier</a:t>
-            </a:r>
-            <a:r>
-              <a:rPr lang="en-US" dirty="0" smtClean="0"/>
-              <a:t>"</a:t>
-            </a:r>
-            <a:r>
-              <a:rPr lang="en-US" dirty="0" smtClean="0"/>
-              <a:t>,</a:t>
-            </a:r>
-            <a:r>
-              <a:rPr lang="en-US" dirty="0" smtClean="0"/>
-              <a:t> 99)</a:t>
-            </a:r>
-            <a:r>
-              <a:rPr lang="en-US" dirty="0" smtClean="0"/>
-              <a:t>;</a:t>
-            </a:r>
-            <a:endParaRPr lang="en-US" dirty="0" smtClean="0"/>
-          </a:p>
-          <a:p>
-            <a:r>
-              <a:rPr lang="en-US" dirty="0" smtClean="0"/>
-              <a:t>		</a:t>
-            </a:r>
-            <a:r>
-              <a:rPr lang="en-US" dirty="0" err="1" smtClean="0"/>
-              <a:t>grades.put(</a:t>
-            </a:r>
-            <a:r>
-              <a:rPr lang="en-US" dirty="0" err="1" smtClean="0"/>
-              <a:t>"Miles</a:t>
-            </a:r>
-            <a:r>
-              <a:rPr lang="en-US" dirty="0" smtClean="0"/>
-              <a:t>"</a:t>
-            </a:r>
-            <a:r>
-              <a:rPr lang="en-US" dirty="0" smtClean="0"/>
-              <a:t>, </a:t>
-            </a:r>
-            <a:r>
-              <a:rPr lang="en-US" dirty="0" smtClean="0"/>
-              <a:t>95);</a:t>
+              <a:t>grades.put("Miles</a:t>
+            </a:r>
+            <a:r>
+              <a:rPr lang="en-US" dirty="0" smtClean="0"/>
+              <a:t>", 95);</a:t>
             </a:r>
           </a:p>
           <a:p>
@@ -5996,7 +5914,6 @@
               <a:rPr lang="en-US" dirty="0" smtClean="0"/>
               <a:t>}</a:t>
             </a:r>
-            <a:endParaRPr lang="en-US" dirty="0" smtClean="0"/>
           </a:p>
           <a:p>
             <a:endParaRPr lang="en-US" dirty="0" smtClean="0"/>
@@ -6015,7 +5932,6 @@
               <a:rPr lang="en-US" dirty="0" smtClean="0"/>
               <a:t> </a:t>
             </a:r>
-            <a:endParaRPr lang="en-US" dirty="0" smtClean="0"/>
           </a:p>
           <a:p>
             <a:endParaRPr lang="en-US" dirty="0" smtClean="0"/>
@@ -6048,6 +5964,13 @@
   <p:clrMapOvr>
     <a:masterClrMapping/>
   </p:clrMapOvr>
+  <p:timing>
+    <p:tnLst>
+      <p:par>
+        <p:cTn id="1" dur="indefinite" restart="never" nodeType="tmRoot"/>
+      </p:par>
+    </p:tnLst>
+  </p:timing>
 </p:sld>
 </file>
 
@@ -6125,11 +6048,7 @@
           <a:p>
             <a:r>
               <a:rPr lang="en-US" dirty="0" smtClean="0"/>
-              <a:t>public class</a:t>
-            </a:r>
-            <a:r>
-              <a:rPr lang="en-US" dirty="0" smtClean="0"/>
-              <a:t> </a:t>
+              <a:t>public class </a:t>
             </a:r>
             <a:r>
               <a:rPr lang="en-US" dirty="0" err="1" smtClean="0"/>
@@ -6137,21 +6056,13 @@
             </a:r>
             <a:r>
               <a:rPr lang="en-US" dirty="0" smtClean="0"/>
-              <a:t> </a:t>
-            </a:r>
-            <a:r>
-              <a:rPr lang="en-US" dirty="0" smtClean="0"/>
-              <a:t>{</a:t>
-            </a:r>
-          </a:p>
-          <a:p>
-            <a:r>
-              <a:rPr lang="en-US" dirty="0" smtClean="0"/>
-              <a:t>	public</a:t>
-            </a:r>
-            <a:r>
-              <a:rPr lang="en-US" dirty="0" smtClean="0"/>
-              <a:t> </a:t>
+              <a:t> {</a:t>
+            </a:r>
+          </a:p>
+          <a:p>
+            <a:r>
+              <a:rPr lang="en-US" dirty="0" smtClean="0"/>
+              <a:t>	public </a:t>
             </a:r>
             <a:r>
               <a:rPr lang="en-US" dirty="0" err="1" smtClean="0"/>
@@ -6165,15 +6076,7 @@
           <a:p>
             <a:r>
               <a:rPr lang="en-US" dirty="0" smtClean="0"/>
-              <a:t>	</a:t>
-            </a:r>
-            <a:r>
-              <a:rPr lang="en-US" dirty="0" smtClean="0"/>
-              <a:t>	Set&lt;String&gt; people </a:t>
-            </a:r>
-            <a:r>
-              <a:rPr lang="en-US" dirty="0" smtClean="0"/>
-              <a:t>= new </a:t>
+              <a:t>		Set&lt;String&gt; people = new </a:t>
             </a:r>
             <a:r>
               <a:rPr lang="en-US" dirty="0" err="1" smtClean="0"/>
@@ -6181,24 +6084,16 @@
             </a:r>
             <a:r>
               <a:rPr lang="en-US" dirty="0" smtClean="0"/>
-              <a:t>&lt;String&gt;</a:t>
-            </a:r>
-            <a:r>
-              <a:rPr lang="en-US" dirty="0" smtClean="0"/>
-              <a:t>();</a:t>
-            </a:r>
-          </a:p>
-          <a:p>
-            <a:endParaRPr lang="en-US" dirty="0" smtClean="0"/>
-          </a:p>
-          <a:p>
-            <a:r>
-              <a:rPr lang="en-US" dirty="0" smtClean="0"/>
-              <a:t>	</a:t>
-            </a:r>
-            <a:r>
-              <a:rPr lang="en-US" dirty="0" smtClean="0"/>
-              <a:t>	</a:t>
+              <a:t>&lt;String&gt;();</a:t>
+            </a:r>
+          </a:p>
+          <a:p>
+            <a:endParaRPr lang="en-US" dirty="0" smtClean="0"/>
+          </a:p>
+          <a:p>
+            <a:r>
+              <a:rPr lang="en-US" dirty="0" smtClean="0"/>
+              <a:t>		</a:t>
             </a:r>
             <a:r>
               <a:rPr lang="en-US" dirty="0" err="1" smtClean="0"/>
@@ -6206,21 +6101,13 @@
             </a:r>
             <a:r>
               <a:rPr lang="en-US" dirty="0" smtClean="0"/>
-              <a:t>")</a:t>
-            </a:r>
-            <a:r>
-              <a:rPr lang="en-US" dirty="0" smtClean="0"/>
-              <a:t>;</a:t>
-            </a:r>
-          </a:p>
-          <a:p>
-            <a:r>
-              <a:rPr lang="en-US" dirty="0" smtClean="0"/>
-              <a:t> 	</a:t>
-            </a:r>
-            <a:r>
-              <a:rPr lang="en-US" dirty="0" smtClean="0"/>
-              <a:t>	</a:t>
+              <a:t>");</a:t>
+            </a:r>
+          </a:p>
+          <a:p>
+            <a:r>
+              <a:rPr lang="en-US" dirty="0" smtClean="0"/>
+              <a:t> 		</a:t>
             </a:r>
             <a:r>
               <a:rPr lang="en-US" dirty="0" err="1" smtClean="0"/>
@@ -6228,21 +6115,13 @@
             </a:r>
             <a:r>
               <a:rPr lang="en-US" dirty="0" smtClean="0"/>
-              <a:t>")</a:t>
-            </a:r>
-            <a:r>
-              <a:rPr lang="en-US" dirty="0" smtClean="0"/>
-              <a:t>;</a:t>
-            </a:r>
-          </a:p>
-          <a:p>
-            <a:r>
-              <a:rPr lang="en-US" dirty="0" smtClean="0"/>
-              <a:t>	</a:t>
-            </a:r>
-            <a:r>
-              <a:rPr lang="en-US" dirty="0" smtClean="0"/>
-              <a:t>	</a:t>
+              <a:t>");</a:t>
+            </a:r>
+          </a:p>
+          <a:p>
+            <a:r>
+              <a:rPr lang="en-US" dirty="0" smtClean="0"/>
+              <a:t>		</a:t>
             </a:r>
             <a:r>
               <a:rPr lang="en-US" dirty="0" err="1" smtClean="0"/>
@@ -6250,13 +6129,8 @@
             </a:r>
             <a:r>
               <a:rPr lang="en-US" dirty="0" smtClean="0"/>
-              <a:t>")</a:t>
-            </a:r>
-            <a:r>
-              <a:rPr lang="en-US" dirty="0" smtClean="0"/>
-              <a:t>;</a:t>
-            </a:r>
-            <a:endParaRPr lang="en-US" dirty="0" smtClean="0"/>
+              <a:t>");</a:t>
+            </a:r>
           </a:p>
           <a:p>
             <a:endParaRPr lang="en-US" dirty="0" smtClean="0"/>
@@ -6274,16 +6148,11 @@
               <a:rPr lang="en-US" dirty="0" smtClean="0"/>
               <a:t>"); //warning! returns false because Mike is already in this Set!	</a:t>
             </a:r>
-            <a:endParaRPr lang="en-US" dirty="0" smtClean="0"/>
-          </a:p>
-          <a:p>
-            <a:r>
-              <a:rPr lang="en-US" dirty="0" smtClean="0"/>
-              <a:t>	</a:t>
-            </a:r>
-            <a:r>
-              <a:rPr lang="en-US" dirty="0" smtClean="0"/>
-              <a:t>	people.add(99); //error! This is Set of Strings!</a:t>
+          </a:p>
+          <a:p>
+            <a:r>
+              <a:rPr lang="en-US" dirty="0" smtClean="0"/>
+              <a:t>		people.add(99); //error! This is Set of Strings!</a:t>
             </a:r>
           </a:p>
           <a:p>
@@ -6360,7 +6229,6 @@
               <a:rPr lang="en-US" dirty="0" smtClean="0"/>
               <a:t>}</a:t>
             </a:r>
-            <a:endParaRPr lang="en-US" dirty="0" smtClean="0"/>
           </a:p>
           <a:p>
             <a:endParaRPr lang="en-US" dirty="0" smtClean="0"/>
@@ -6394,7 +6262,6 @@
               <a:rPr lang="en-US" dirty="0" smtClean="0"/>
               <a:t> </a:t>
             </a:r>
-            <a:endParaRPr lang="en-US" dirty="0" smtClean="0"/>
           </a:p>
           <a:p>
             <a:endParaRPr lang="en-US" dirty="0" smtClean="0"/>
@@ -6427,6 +6294,13 @@
   <p:clrMapOvr>
     <a:masterClrMapping/>
   </p:clrMapOvr>
+  <p:timing>
+    <p:tnLst>
+      <p:par>
+        <p:cTn id="1" dur="indefinite" restart="never" nodeType="tmRoot"/>
+      </p:par>
+    </p:tnLst>
+  </p:timing>
 </p:sld>
 </file>
 

</xml_diff>

<commit_message>
added stuff for week3 thurs
</commit_message>
<xml_diff>
--- a/slides/week3_tues.pptx
+++ b/slides/week3_tues.pptx
@@ -5,10 +5,10 @@
     <p:sldMasterId id="2147483648" r:id="rId1"/>
   </p:sldMasterIdLst>
   <p:notesMasterIdLst>
-    <p:notesMasterId r:id="rId13"/>
+    <p:notesMasterId r:id="rId14"/>
   </p:notesMasterIdLst>
   <p:handoutMasterIdLst>
-    <p:handoutMasterId r:id="rId14"/>
+    <p:handoutMasterId r:id="rId15"/>
   </p:handoutMasterIdLst>
   <p:sldIdLst>
     <p:sldId id="262" r:id="rId2"/>
@@ -22,6 +22,7 @@
     <p:sldId id="283" r:id="rId10"/>
     <p:sldId id="274" r:id="rId11"/>
     <p:sldId id="284" r:id="rId12"/>
+    <p:sldId id="285" r:id="rId13"/>
   </p:sldIdLst>
   <p:sldSz cx="9144000" cy="6858000" type="screen4x3"/>
   <p:notesSz cx="6858000" cy="9144000"/>
@@ -206,7 +207,7 @@
             <a:fld id="{43DBBD18-6C88-F045-A73C-EAB7098132B3}" type="datetime1">
               <a:rPr lang="en-US" smtClean="0"/>
               <a:pPr/>
-              <a:t>10/13/10</a:t>
+              <a:t>10/14/10</a:t>
             </a:fld>
             <a:endParaRPr lang="en-US"/>
           </a:p>
@@ -369,7 +370,7 @@
             <a:fld id="{EAEF232E-3F8A-2D4B-A08F-882F821D32B7}" type="datetime1">
               <a:rPr lang="en-US" smtClean="0"/>
               <a:pPr/>
-              <a:t>10/13/10</a:t>
+              <a:t>10/14/10</a:t>
             </a:fld>
             <a:endParaRPr lang="en-US"/>
           </a:p>
@@ -4219,11 +4220,7 @@
           <a:p>
             <a:r>
               <a:rPr lang="en-US" dirty="0" smtClean="0"/>
-              <a:t>see code </a:t>
-            </a:r>
-            <a:r>
-              <a:rPr lang="en-US" dirty="0" smtClean="0"/>
-              <a:t>example (</a:t>
+              <a:t>see code example (</a:t>
             </a:r>
             <a:r>
               <a:rPr lang="en-US" dirty="0" err="1" smtClean="0"/>
@@ -4249,6 +4246,89 @@
       </p:par>
     </p:tnLst>
   </p:timing>
+</p:sld>
+</file>
+
+<file path=ppt/slides/slide12.xml><?xml version="1.0" encoding="utf-8"?>
+<p:sld xmlns:a="http://schemas.openxmlformats.org/drawingml/2006/main" xmlns:r="http://schemas.openxmlformats.org/officeDocument/2006/relationships" xmlns:mc="http://schemas.openxmlformats.org/markup-compatibility/2006" xmlns:mv="urn:schemas-microsoft-com:mac:vml" xmlns:p="http://schemas.openxmlformats.org/presentationml/2006/main" mc:Ignorable="mv" mc:PreserveAttributes="mv:*">
+  <p:cSld>
+    <p:spTree>
+      <p:nvGrpSpPr>
+        <p:cNvPr id="1" name=""/>
+        <p:cNvGrpSpPr/>
+        <p:nvPr/>
+      </p:nvGrpSpPr>
+      <p:grpSpPr>
+        <a:xfrm>
+          <a:off x="0" y="0"/>
+          <a:ext cx="0" cy="0"/>
+          <a:chOff x="0" y="0"/>
+          <a:chExt cx="0" cy="0"/>
+        </a:xfrm>
+      </p:grpSpPr>
+      <p:sp>
+        <p:nvSpPr>
+          <p:cNvPr id="2" name="Title 1"/>
+          <p:cNvSpPr>
+            <a:spLocks noGrp="1"/>
+          </p:cNvSpPr>
+          <p:nvPr>
+            <p:ph type="title"/>
+          </p:nvPr>
+        </p:nvSpPr>
+        <p:spPr/>
+        <p:txBody>
+          <a:bodyPr/>
+          <a:lstStyle/>
+          <a:p>
+            <a:r>
+              <a:rPr lang="en-US" dirty="0" smtClean="0"/>
+              <a:t>Recursion</a:t>
+            </a:r>
+            <a:endParaRPr lang="en-US" dirty="0"/>
+          </a:p>
+        </p:txBody>
+      </p:sp>
+      <p:sp>
+        <p:nvSpPr>
+          <p:cNvPr id="3" name="Content Placeholder 2"/>
+          <p:cNvSpPr>
+            <a:spLocks noGrp="1"/>
+          </p:cNvSpPr>
+          <p:nvPr>
+            <p:ph idx="1"/>
+          </p:nvPr>
+        </p:nvSpPr>
+        <p:spPr/>
+        <p:txBody>
+          <a:bodyPr/>
+          <a:lstStyle/>
+          <a:p>
+            <a:r>
+              <a:rPr lang="en-US" dirty="0" smtClean="0"/>
+              <a:t>see code examples under code dir: </a:t>
+            </a:r>
+            <a:r>
+              <a:rPr lang="en-US" dirty="0" err="1" smtClean="0"/>
+              <a:t>TreeRecursion.java</a:t>
+            </a:r>
+            <a:r>
+              <a:rPr lang="en-US" dirty="0" smtClean="0"/>
+              <a:t> and </a:t>
+            </a:r>
+            <a:r>
+              <a:rPr lang="en-US" dirty="0" err="1" smtClean="0"/>
+              <a:t>TreeNode.java</a:t>
+            </a:r>
+            <a:endParaRPr lang="en-US" dirty="0"/>
+          </a:p>
+        </p:txBody>
+      </p:sp>
+    </p:spTree>
+  </p:cSld>
+  <p:clrMapOvr>
+    <a:masterClrMapping/>
+  </p:clrMapOvr>
 </p:sld>
 </file>
 
@@ -5245,11 +5325,7 @@
             </a:r>
             <a:r>
               <a:rPr lang="en-US" dirty="0" smtClean="0"/>
-              <a:t> provides links between each element and its neighbors. It is slower to grab something in the middle of the list (as you have to traverse the List until you find it), but much faster to manipulate. If you add something to it you simply update the links, rather than shifting all of the elements</a:t>
-            </a:r>
-            <a:r>
-              <a:rPr lang="en-US" dirty="0" smtClean="0"/>
-              <a:t>.</a:t>
+              <a:t> provides links between each element and its neighbors. It is slower to grab something in the middle of the list (as you have to traverse the List until you find it), but much faster to manipulate. If you add something to it you simply update the links, rather than shifting all of the elements.</a:t>
             </a:r>
           </a:p>
           <a:p>

</xml_diff>